<commit_message>
Completed simple front end and back end. Linked to Supabase!
</commit_message>
<xml_diff>
--- a/Presentations/B.R.P presenation with sources.pptx
+++ b/Presentations/B.R.P presenation with sources.pptx
@@ -262,7 +262,7 @@
                 <a:latin typeface="+mj-ea"/>
                 <a:ea typeface="+mj-ea"/>
               </a:rPr>
-              <a:t>2025-06-01</a:t>
+              <a:t>2025-06-02</a:t>
             </a:fld>
             <a:endParaRPr lang="ko-KR" altLang="en-US" dirty="0">
               <a:latin typeface="+mj-ea"/>
@@ -448,7 +448,7 @@
             <a:fld id="{DC06A2C1-A9EB-4898-A387-106DFED4BED0}" type="datetime1">
               <a:rPr lang="ko-KR" altLang="en-US" smtClean="0"/>
               <a:pPr/>
-              <a:t>2025-06-01</a:t>
+              <a:t>2025-06-02</a:t>
             </a:fld>
             <a:endParaRPr lang="ko-KR" altLang="en-US" dirty="0"/>
           </a:p>
@@ -1576,7 +1576,7 @@
           <a:p>
             <a:fld id="{4EBB724D-71E1-4DCA-86A7-3E42B461DE10}" type="datetime1">
               <a:rPr lang="ko-KR" altLang="en-US" smtClean="0"/>
-              <a:t>2025-06-01</a:t>
+              <a:t>2025-06-02</a:t>
             </a:fld>
             <a:endParaRPr lang="ko-KR" altLang="en-US" dirty="0"/>
           </a:p>
@@ -2231,7 +2231,7 @@
           <a:p>
             <a:fld id="{664DCE5A-71AA-4BD9-B96E-5BE2121D3AB0}" type="datetime1">
               <a:rPr lang="ko-KR" altLang="en-US" smtClean="0"/>
-              <a:t>2025-06-01</a:t>
+              <a:t>2025-06-02</a:t>
             </a:fld>
             <a:endParaRPr lang="ko-KR" altLang="en-US" dirty="0"/>
           </a:p>
@@ -2755,6 +2755,30 @@
             <a:pPr marL="0" indent="0" rtl="0">
               <a:buNone/>
             </a:pPr>
+            <a:r>
+              <a:rPr lang="ko-KR" altLang="en-US" sz="2400" dirty="0">
+                <a:solidFill>
+                  <a:schemeClr val="bg1"/>
+                </a:solidFill>
+              </a:rPr>
+              <a:t>고동재의 </a:t>
+            </a:r>
+            <a:r>
+              <a:rPr lang="en-US" altLang="ko-KR" sz="2400" dirty="0">
+                <a:solidFill>
+                  <a:schemeClr val="bg1"/>
+                </a:solidFill>
+              </a:rPr>
+              <a:t>Blind </a:t>
+            </a:r>
+            <a:r>
+              <a:rPr lang="en-US" altLang="ko-KR" sz="2400">
+                <a:solidFill>
+                  <a:schemeClr val="bg1"/>
+                </a:solidFill>
+              </a:rPr>
+              <a:t>Running Project</a:t>
+            </a:r>
             <a:endParaRPr lang="ko-KR" altLang="en-US" sz="2400" dirty="0">
               <a:solidFill>
                 <a:schemeClr val="bg1"/>
@@ -8660,6 +8684,15 @@
 </file>
 
 <file path=customXml/item2.xml><?xml version="1.0" encoding="utf-8"?>
+<?mso-contentType ?>
+<FormTemplates xmlns="http://schemas.microsoft.com/sharepoint/v3/contenttype/forms">
+  <Display>DocumentLibraryForm</Display>
+  <Edit>DocumentLibraryForm</Edit>
+  <New>DocumentLibraryForm</New>
+</FormTemplates>
+</file>
+
+<file path=customXml/item3.xml><?xml version="1.0" encoding="utf-8"?>
 <ct:contentTypeSchema xmlns:ct="http://schemas.microsoft.com/office/2006/metadata/contentType" xmlns:ma="http://schemas.microsoft.com/office/2006/metadata/properties/metaAttributes" ct:_="" ma:_="" ma:contentTypeName="Document" ma:contentTypeID="0x01010079F111ED35F8CC479449609E8A0923A6" ma:contentTypeVersion="12" ma:contentTypeDescription="Create a new document." ma:contentTypeScope="" ma:versionID="a8a52e8c320b9a064ae3583ae3861c92">
   <xsd:schema xmlns:xsd="http://www.w3.org/2001/XMLSchema" xmlns:xs="http://www.w3.org/2001/XMLSchema" xmlns:p="http://schemas.microsoft.com/office/2006/metadata/properties" xmlns:ns2="71af3243-3dd4-4a8d-8c0d-dd76da1f02a5" xmlns:ns3="16c05727-aa75-4e4a-9b5f-8a80a1165891" targetNamespace="http://schemas.microsoft.com/office/2006/metadata/properties" ma:root="true" ma:fieldsID="88020cb39231a0945110f9cd888b521a" ns2:_="" ns3:_="">
     <xsd:import namespace="71af3243-3dd4-4a8d-8c0d-dd76da1f02a5"/>
@@ -8880,15 +8913,6 @@
 </ct:contentTypeSchema>
 </file>
 
-<file path=customXml/item3.xml><?xml version="1.0" encoding="utf-8"?>
-<?mso-contentType ?>
-<FormTemplates xmlns="http://schemas.microsoft.com/sharepoint/v3/contenttype/forms">
-  <Display>DocumentLibraryForm</Display>
-  <Edit>DocumentLibraryForm</Edit>
-  <New>DocumentLibraryForm</New>
-</FormTemplates>
-</file>
-
 <file path=customXml/itemProps1.xml><?xml version="1.0" encoding="utf-8"?>
 <ds:datastoreItem xmlns:ds="http://schemas.openxmlformats.org/officeDocument/2006/customXml" ds:itemID="{950072C5-DDE0-4258-BA7A-4D4B80DFA632}">
   <ds:schemaRefs>
@@ -8907,6 +8931,14 @@
 </file>
 
 <file path=customXml/itemProps2.xml><?xml version="1.0" encoding="utf-8"?>
+<ds:datastoreItem xmlns:ds="http://schemas.openxmlformats.org/officeDocument/2006/customXml" ds:itemID="{7EE8C63A-4744-4DE4-BB49-0FF0B5375C60}">
+  <ds:schemaRefs>
+    <ds:schemaRef ds:uri="http://schemas.microsoft.com/sharepoint/v3/contenttype/forms"/>
+  </ds:schemaRefs>
+</ds:datastoreItem>
+</file>
+
+<file path=customXml/itemProps3.xml><?xml version="1.0" encoding="utf-8"?>
 <ds:datastoreItem xmlns:ds="http://schemas.openxmlformats.org/officeDocument/2006/customXml" ds:itemID="{FD7FC771-7DFE-49DA-B577-71181BFBCB2E}">
   <ds:schemaRefs>
     <ds:schemaRef ds:uri="http://schemas.microsoft.com/office/2006/metadata/contentType"/>
@@ -8923,12 +8955,4 @@
     <ds:schemaRef ds:uri="http://schemas.microsoft.com/internal/obd"/>
   </ds:schemaRefs>
 </ds:datastoreItem>
-</file>
-
-<file path=customXml/itemProps3.xml><?xml version="1.0" encoding="utf-8"?>
-<ds:datastoreItem xmlns:ds="http://schemas.openxmlformats.org/officeDocument/2006/customXml" ds:itemID="{7EE8C63A-4744-4DE4-BB49-0FF0B5375C60}">
-  <ds:schemaRefs>
-    <ds:schemaRef ds:uri="http://schemas.microsoft.com/sharepoint/v3/contenttype/forms"/>
-  </ds:schemaRefs>
-</ds:datastoreItem>
 </file>
</xml_diff>